<commit_message>
Updates license on all sheets from CC BY to CC BY SA
</commit_message>
<xml_diff>
--- a/powerpoints/caret.pptx
+++ b/powerpoints/caret.pptx
@@ -3132,7 +3132,7 @@
       </p:sp>
       <p:sp>
         <p:nvSpPr>
-          <p:cNvPr id="121" name="CC BY Max Kuhn  •  max@rstudio.com  •  https://github.com/topepo/"/>
+          <p:cNvPr id="121" name="CC BY SA  Max Kuhn  •  max@rstudio.com  •  https://github.com/topepo/"/>
           <p:cNvSpPr txBox="1"/>
           <p:nvPr/>
         </p:nvSpPr>
@@ -3171,16 +3171,13 @@
               </a:defRPr>
             </a:pPr>
             <a:r>
-              <a:rPr u="sng">
-                <a:solidFill>
-                  <a:schemeClr val="accent1"/>
-                </a:solidFill>
+              <a:rPr>
                 <a:hlinkClick r:id="rId2" invalidUrl="" action="" tgtFrame="" tooltip="" history="1" highlightClick="0" endSnd="0"/>
               </a:rPr>
-              <a:t>CC BY </a:t>
-            </a:r>
-            <a:r>
-              <a:t>Max Kuhn  •  max@rstudio.com  •  </a:t>
+              <a:t>CC BY SA</a:t>
+            </a:r>
+            <a:r>
+              <a:t>  Max Kuhn  •  max@rstudio.com  •  </a:t>
             </a:r>
             <a:r>
               <a:rPr sz="800">

</xml_diff>